<commit_message>
#1101 Class 설계서 작성 RegiList, EditList 클래스 속성 수정
</commit_message>
<xml_diff>
--- a/03 설계/Class 설계서_8_Palzo.pptx
+++ b/03 설계/Class 설계서_8_Palzo.pptx
@@ -1112,7 +1112,7 @@
           <p:nvPr userDrawn="1">
             <p:extLst>
               <p:ext uri="{D42A27DB-BD31-4B8C-83A1-F6EECF244321}">
-                <p14:modId xmlns:p14="http://schemas.microsoft.com/office/powerpoint/2010/main" val="3774919505"/>
+                <p14:modId xmlns:p14="http://schemas.microsoft.com/office/powerpoint/2010/main" val="2761812855"/>
               </p:ext>
             </p:extLst>
           </p:nvPr>
@@ -1890,7 +1890,7 @@
                           <a:latin typeface="맑은 고딕" pitchFamily="50" charset="-127"/>
                           <a:ea typeface="맑은 고딕" pitchFamily="50" charset="-127"/>
                         </a:rPr>
-                        <a:t>V 0.1</a:t>
+                        <a:t>V 1.0</a:t>
                       </a:r>
                       <a:endParaRPr kumimoji="1" lang="ko-KR" altLang="ko-KR" sz="900" b="0" i="0" u="none" strike="noStrike" cap="none" normalizeH="0" baseline="0" dirty="0">
                         <a:ln>
@@ -3212,7 +3212,7 @@
             <p:ph idx="1"/>
             <p:extLst>
               <p:ext uri="{D42A27DB-BD31-4B8C-83A1-F6EECF244321}">
-                <p14:modId xmlns:p14="http://schemas.microsoft.com/office/powerpoint/2010/main" val="3920982081"/>
+                <p14:modId xmlns:p14="http://schemas.microsoft.com/office/powerpoint/2010/main" val="2345685019"/>
               </p:ext>
             </p:extLst>
           </p:nvPr>
@@ -3639,6 +3639,16 @@
                     <a:lstStyle/>
                     <a:p>
                       <a:pPr algn="ctr" latinLnBrk="1"/>
+                      <a:r>
+                        <a:rPr lang="en-US" altLang="ko-KR" sz="1200" b="0" dirty="0">
+                          <a:solidFill>
+                            <a:schemeClr val="tx1"/>
+                          </a:solidFill>
+                          <a:latin typeface="맑은 고딕" pitchFamily="50" charset="-127"/>
+                          <a:ea typeface="맑은 고딕" pitchFamily="50" charset="-127"/>
+                        </a:rPr>
+                        <a:t>2018-05-02</a:t>
+                      </a:r>
                       <a:endParaRPr lang="ko-KR" altLang="en-US" sz="1200" b="0" dirty="0">
                         <a:solidFill>
                           <a:schemeClr val="tx1"/>
@@ -3660,6 +3670,16 @@
                     <a:lstStyle/>
                     <a:p>
                       <a:pPr algn="ctr" latinLnBrk="1"/>
+                      <a:r>
+                        <a:rPr lang="en-US" altLang="ko-KR" sz="1200" b="0" dirty="0">
+                          <a:solidFill>
+                            <a:schemeClr val="tx1"/>
+                          </a:solidFill>
+                          <a:latin typeface="맑은 고딕" pitchFamily="50" charset="-127"/>
+                          <a:ea typeface="맑은 고딕" pitchFamily="50" charset="-127"/>
+                        </a:rPr>
+                        <a:t>V.1.0</a:t>
+                      </a:r>
                       <a:endParaRPr lang="ko-KR" altLang="en-US" sz="1200" b="0" dirty="0">
                         <a:solidFill>
                           <a:schemeClr val="tx1"/>
@@ -3681,13 +3701,56 @@
                     <a:lstStyle/>
                     <a:p>
                       <a:pPr algn="ctr" latinLnBrk="1"/>
-                      <a:endParaRPr lang="ko-KR" altLang="en-US" sz="1200" b="0" dirty="0">
-                        <a:solidFill>
-                          <a:schemeClr val="tx1"/>
-                        </a:solidFill>
-                        <a:latin typeface="맑은 고딕" pitchFamily="50" charset="-127"/>
-                        <a:ea typeface="맑은 고딕" pitchFamily="50" charset="-127"/>
-                      </a:endParaRPr>
+                      <a:r>
+                        <a:rPr lang="en-US" altLang="ko-KR" sz="1200" b="0" dirty="0" err="1">
+                          <a:solidFill>
+                            <a:schemeClr val="tx1"/>
+                          </a:solidFill>
+                          <a:latin typeface="맑은 고딕" pitchFamily="50" charset="-127"/>
+                          <a:ea typeface="맑은 고딕" pitchFamily="50" charset="-127"/>
+                        </a:rPr>
+                        <a:t>RegiList</a:t>
+                      </a:r>
+                      <a:r>
+                        <a:rPr lang="en-US" altLang="ko-KR" sz="1200" b="0" dirty="0">
+                          <a:solidFill>
+                            <a:schemeClr val="tx1"/>
+                          </a:solidFill>
+                          <a:latin typeface="맑은 고딕" pitchFamily="50" charset="-127"/>
+                          <a:ea typeface="맑은 고딕" pitchFamily="50" charset="-127"/>
+                        </a:rPr>
+                        <a:t>, </a:t>
+                      </a:r>
+                      <a:r>
+                        <a:rPr lang="en-US" altLang="ko-KR" sz="1200" b="0" dirty="0" err="1">
+                          <a:solidFill>
+                            <a:schemeClr val="tx1"/>
+                          </a:solidFill>
+                          <a:latin typeface="맑은 고딕" pitchFamily="50" charset="-127"/>
+                          <a:ea typeface="맑은 고딕" pitchFamily="50" charset="-127"/>
+                        </a:rPr>
+                        <a:t>EditList</a:t>
+                      </a:r>
+                      <a:r>
+                        <a:rPr lang="en-US" altLang="ko-KR" sz="1200" b="0" dirty="0">
+                          <a:solidFill>
+                            <a:schemeClr val="tx1"/>
+                          </a:solidFill>
+                          <a:latin typeface="맑은 고딕" pitchFamily="50" charset="-127"/>
+                          <a:ea typeface="맑은 고딕" pitchFamily="50" charset="-127"/>
+                        </a:rPr>
+                        <a:t> </a:t>
+                      </a:r>
+                      <a:r>
+                        <a:rPr lang="ko-KR" altLang="en-US" sz="1200" b="0" dirty="0">
+                          <a:solidFill>
+                            <a:schemeClr val="tx1"/>
+                          </a:solidFill>
+                          <a:latin typeface="맑은 고딕" pitchFamily="50" charset="-127"/>
+                          <a:ea typeface="맑은 고딕" pitchFamily="50" charset="-127"/>
+                        </a:rPr>
+                        <a:t>수정</a:t>
+                      </a:r>
                     </a:p>
                   </a:txBody>
                   <a:tcPr anchor="ctr">
@@ -3702,6 +3765,16 @@
                     <a:lstStyle/>
                     <a:p>
                       <a:pPr algn="ctr" latinLnBrk="1"/>
+                      <a:r>
+                        <a:rPr lang="ko-KR" altLang="en-US" sz="1200" b="0" dirty="0" err="1">
+                          <a:solidFill>
+                            <a:schemeClr val="tx1"/>
+                          </a:solidFill>
+                          <a:latin typeface="맑은 고딕" pitchFamily="50" charset="-127"/>
+                          <a:ea typeface="맑은 고딕" pitchFamily="50" charset="-127"/>
+                        </a:rPr>
+                        <a:t>김한동</a:t>
+                      </a:r>
                       <a:endParaRPr lang="ko-KR" altLang="en-US" sz="1200" b="0" dirty="0">
                         <a:solidFill>
                           <a:schemeClr val="tx1"/>
@@ -3730,7 +3803,7 @@
                     <a:lstStyle/>
                     <a:p>
                       <a:pPr algn="ctr" latinLnBrk="1"/>
-                      <a:endParaRPr lang="ko-KR" altLang="en-US" sz="1200" b="0">
+                      <a:endParaRPr lang="ko-KR" altLang="en-US" sz="1200" b="0" dirty="0">
                         <a:solidFill>
                           <a:schemeClr val="tx1"/>
                         </a:solidFill>
@@ -20256,7 +20329,7 @@
           <p:nvPr>
             <p:extLst>
               <p:ext uri="{D42A27DB-BD31-4B8C-83A1-F6EECF244321}">
-                <p14:modId xmlns:p14="http://schemas.microsoft.com/office/powerpoint/2010/main" val="2594750605"/>
+                <p14:modId xmlns:p14="http://schemas.microsoft.com/office/powerpoint/2010/main" val="3872071302"/>
               </p:ext>
             </p:extLst>
           </p:nvPr>
@@ -20683,8 +20756,21 @@
                             <a:schemeClr val="tx1"/>
                           </a:solidFill>
                         </a:rPr>
-                        <a:t>-Importance : ???</a:t>
-                      </a:r>
+                        <a:t>-Importance : </a:t>
+                      </a:r>
+                      <a:r>
+                        <a:rPr lang="en-US" altLang="ko-KR" sz="1100" dirty="0" err="1">
+                          <a:solidFill>
+                            <a:schemeClr val="tx1"/>
+                          </a:solidFill>
+                        </a:rPr>
+                        <a:t>JScrollPane</a:t>
+                      </a:r>
+                      <a:endParaRPr lang="en-US" altLang="ko-KR" sz="1100" dirty="0">
+                        <a:solidFill>
+                          <a:schemeClr val="tx1"/>
+                        </a:solidFill>
+                      </a:endParaRPr>
                     </a:p>
                     <a:p>
                       <a:pPr algn="l" latinLnBrk="1"/>
@@ -20710,8 +20796,21 @@
                             <a:schemeClr val="tx1"/>
                           </a:solidFill>
                         </a:rPr>
-                        <a:t> : ???</a:t>
-                      </a:r>
+                        <a:t> : </a:t>
+                      </a:r>
+                      <a:r>
+                        <a:rPr lang="en-US" altLang="ko-KR" sz="1100" dirty="0" err="1">
+                          <a:solidFill>
+                            <a:schemeClr val="tx1"/>
+                          </a:solidFill>
+                        </a:rPr>
+                        <a:t>JScrollPane</a:t>
+                      </a:r>
+                      <a:endParaRPr lang="en-US" altLang="ko-KR" sz="1100" dirty="0">
+                        <a:solidFill>
+                          <a:schemeClr val="tx1"/>
+                        </a:solidFill>
+                      </a:endParaRPr>
                     </a:p>
                     <a:p>
                       <a:pPr algn="l" latinLnBrk="1"/>
@@ -20785,7 +20884,7 @@
                             <a:schemeClr val="tx1"/>
                           </a:solidFill>
                         </a:rPr>
-                        <a:t>JButton</a:t>
+                        <a:t>Jbutton</a:t>
                       </a:r>
                       <a:endParaRPr lang="en-US" altLang="ko-KR" sz="1100" dirty="0">
                         <a:solidFill>
@@ -21664,7 +21763,7 @@
           <p:nvPr>
             <p:extLst>
               <p:ext uri="{D42A27DB-BD31-4B8C-83A1-F6EECF244321}">
-                <p14:modId xmlns:p14="http://schemas.microsoft.com/office/powerpoint/2010/main" val="2282533263"/>
+                <p14:modId xmlns:p14="http://schemas.microsoft.com/office/powerpoint/2010/main" val="2603393619"/>
               </p:ext>
             </p:extLst>
           </p:nvPr>
@@ -22091,8 +22190,21 @@
                             <a:schemeClr val="tx1"/>
                           </a:solidFill>
                         </a:rPr>
-                        <a:t>-Importance : ???</a:t>
-                      </a:r>
+                        <a:t>-Importance : </a:t>
+                      </a:r>
+                      <a:r>
+                        <a:rPr lang="en-US" altLang="ko-KR" sz="1100" dirty="0" err="1">
+                          <a:solidFill>
+                            <a:schemeClr val="tx1"/>
+                          </a:solidFill>
+                        </a:rPr>
+                        <a:t>JScrollPane</a:t>
+                      </a:r>
+                      <a:endParaRPr lang="en-US" altLang="ko-KR" sz="1100" dirty="0">
+                        <a:solidFill>
+                          <a:schemeClr val="tx1"/>
+                        </a:solidFill>
+                      </a:endParaRPr>
                     </a:p>
                     <a:p>
                       <a:pPr algn="l" latinLnBrk="1"/>
@@ -22118,8 +22230,21 @@
                             <a:schemeClr val="tx1"/>
                           </a:solidFill>
                         </a:rPr>
-                        <a:t> : ???</a:t>
-                      </a:r>
+                        <a:t> : </a:t>
+                      </a:r>
+                      <a:r>
+                        <a:rPr lang="en-US" altLang="ko-KR" sz="1100" dirty="0" err="1">
+                          <a:solidFill>
+                            <a:schemeClr val="tx1"/>
+                          </a:solidFill>
+                        </a:rPr>
+                        <a:t>JScrollPane</a:t>
+                      </a:r>
+                      <a:endParaRPr lang="en-US" altLang="ko-KR" sz="1100" dirty="0">
+                        <a:solidFill>
+                          <a:schemeClr val="tx1"/>
+                        </a:solidFill>
+                      </a:endParaRPr>
                     </a:p>
                     <a:p>
                       <a:pPr algn="l" latinLnBrk="1"/>

</xml_diff>

<commit_message>
#1101 Class 설계서 작성
회원정보찾기 UI 변경에 따른 클래스 수정
</commit_message>
<xml_diff>
--- a/03 설계/Class 설계서_8_Palzo.pptx
+++ b/03 설계/Class 설계서_8_Palzo.pptx
@@ -1117,7 +1117,7 @@
           <p:nvPr userDrawn="1">
             <p:extLst>
               <p:ext uri="{D42A27DB-BD31-4B8C-83A1-F6EECF244321}">
-                <p14:modId xmlns:p14="http://schemas.microsoft.com/office/powerpoint/2010/main" val="4283253912"/>
+                <p14:modId xmlns:p14="http://schemas.microsoft.com/office/powerpoint/2010/main" val="598781424"/>
               </p:ext>
             </p:extLst>
           </p:nvPr>
@@ -1895,7 +1895,7 @@
                           <a:latin typeface="맑은 고딕" pitchFamily="50" charset="-127"/>
                           <a:ea typeface="맑은 고딕" pitchFamily="50" charset="-127"/>
                         </a:rPr>
-                        <a:t>V 2.0</a:t>
+                        <a:t>V 2.1</a:t>
                       </a:r>
                       <a:endParaRPr kumimoji="1" lang="ko-KR" altLang="ko-KR" sz="900" b="0" i="0" u="none" strike="noStrike" cap="none" normalizeH="0" baseline="0" dirty="0">
                         <a:ln>
@@ -10102,14 +10102,14 @@
           <p:nvPr>
             <p:extLst>
               <p:ext uri="{D42A27DB-BD31-4B8C-83A1-F6EECF244321}">
-                <p14:modId xmlns:p14="http://schemas.microsoft.com/office/powerpoint/2010/main" val="1353358350"/>
+                <p14:modId xmlns:p14="http://schemas.microsoft.com/office/powerpoint/2010/main" val="1964592612"/>
               </p:ext>
             </p:extLst>
           </p:nvPr>
         </p:nvGraphicFramePr>
         <p:xfrm>
           <a:off x="4533633" y="1384496"/>
-          <a:ext cx="1878676" cy="1996440"/>
+          <a:ext cx="1878676" cy="1661160"/>
         </p:xfrm>
         <a:graphic>
           <a:graphicData uri="http://schemas.openxmlformats.org/drawingml/2006/table">
@@ -10218,86 +10218,6 @@
                           </a:solidFill>
                         </a:rPr>
                         <a:t>sendButton</a:t>
-                      </a:r>
-                      <a:r>
-                        <a:rPr lang="en-US" altLang="ko-KR" sz="1100" dirty="0">
-                          <a:solidFill>
-                            <a:schemeClr val="tx1"/>
-                          </a:solidFill>
-                        </a:rPr>
-                        <a:t> : </a:t>
-                      </a:r>
-                      <a:r>
-                        <a:rPr lang="en-US" altLang="ko-KR" sz="1100" dirty="0" err="1">
-                          <a:solidFill>
-                            <a:schemeClr val="tx1"/>
-                          </a:solidFill>
-                        </a:rPr>
-                        <a:t>JButton</a:t>
-                      </a:r>
-                      <a:endParaRPr lang="en-US" altLang="ko-KR" sz="1100" dirty="0">
-                        <a:solidFill>
-                          <a:schemeClr val="tx1"/>
-                        </a:solidFill>
-                      </a:endParaRPr>
-                    </a:p>
-                    <a:p>
-                      <a:pPr algn="l" latinLnBrk="1"/>
-                      <a:r>
-                        <a:rPr lang="en-US" altLang="ko-KR" sz="1100" dirty="0">
-                          <a:solidFill>
-                            <a:schemeClr val="tx1"/>
-                          </a:solidFill>
-                        </a:rPr>
-                        <a:t>-</a:t>
-                      </a:r>
-                      <a:r>
-                        <a:rPr lang="en-US" altLang="ko-KR" sz="1100" dirty="0" err="1">
-                          <a:solidFill>
-                            <a:schemeClr val="tx1"/>
-                          </a:solidFill>
-                        </a:rPr>
-                        <a:t>findId</a:t>
-                      </a:r>
-                      <a:r>
-                        <a:rPr lang="en-US" altLang="ko-KR" sz="1100" dirty="0">
-                          <a:solidFill>
-                            <a:schemeClr val="tx1"/>
-                          </a:solidFill>
-                        </a:rPr>
-                        <a:t> : </a:t>
-                      </a:r>
-                      <a:r>
-                        <a:rPr lang="en-US" altLang="ko-KR" sz="1100" dirty="0" err="1">
-                          <a:solidFill>
-                            <a:schemeClr val="tx1"/>
-                          </a:solidFill>
-                        </a:rPr>
-                        <a:t>JButton</a:t>
-                      </a:r>
-                      <a:endParaRPr lang="en-US" altLang="ko-KR" sz="1100" dirty="0">
-                        <a:solidFill>
-                          <a:schemeClr val="tx1"/>
-                        </a:solidFill>
-                      </a:endParaRPr>
-                    </a:p>
-                    <a:p>
-                      <a:pPr algn="l" latinLnBrk="1"/>
-                      <a:r>
-                        <a:rPr lang="en-US" altLang="ko-KR" sz="1100" dirty="0">
-                          <a:solidFill>
-                            <a:schemeClr val="tx1"/>
-                          </a:solidFill>
-                        </a:rPr>
-                        <a:t>-</a:t>
-                      </a:r>
-                      <a:r>
-                        <a:rPr lang="en-US" altLang="ko-KR" sz="1100" dirty="0" err="1">
-                          <a:solidFill>
-                            <a:schemeClr val="tx1"/>
-                          </a:solidFill>
-                        </a:rPr>
-                        <a:t>findPw</a:t>
                       </a:r>
                       <a:r>
                         <a:rPr lang="en-US" altLang="ko-KR" sz="1100" dirty="0">
@@ -17366,14 +17286,14 @@
             <p:ph idx="1"/>
             <p:extLst>
               <p:ext uri="{D42A27DB-BD31-4B8C-83A1-F6EECF244321}">
-                <p14:modId xmlns:p14="http://schemas.microsoft.com/office/powerpoint/2010/main" val="2519675277"/>
+                <p14:modId xmlns:p14="http://schemas.microsoft.com/office/powerpoint/2010/main" val="1772018461"/>
               </p:ext>
             </p:extLst>
           </p:nvPr>
         </p:nvGraphicFramePr>
         <p:xfrm>
           <a:off x="280988" y="1025525"/>
-          <a:ext cx="8582024" cy="3053080"/>
+          <a:ext cx="8582024" cy="3139440"/>
         </p:xfrm>
         <a:graphic>
           <a:graphicData uri="http://schemas.openxmlformats.org/drawingml/2006/table">
@@ -18114,7 +18034,17 @@
                     <a:lstStyle/>
                     <a:p>
                       <a:pPr algn="ctr" latinLnBrk="1"/>
-                      <a:endParaRPr lang="ko-KR" altLang="en-US" sz="1200" b="0">
+                      <a:r>
+                        <a:rPr lang="en-US" altLang="ko-KR" sz="1200" b="0" dirty="0">
+                          <a:solidFill>
+                            <a:schemeClr val="tx1"/>
+                          </a:solidFill>
+                          <a:latin typeface="맑은 고딕" pitchFamily="50" charset="-127"/>
+                          <a:ea typeface="맑은 고딕" pitchFamily="50" charset="-127"/>
+                        </a:rPr>
+                        <a:t>2018-05-03</a:t>
+                      </a:r>
+                      <a:endParaRPr lang="ko-KR" altLang="en-US" sz="1200" b="0" dirty="0">
                         <a:solidFill>
                           <a:schemeClr val="tx1"/>
                         </a:solidFill>
@@ -18135,6 +18065,16 @@
                     <a:lstStyle/>
                     <a:p>
                       <a:pPr algn="ctr" latinLnBrk="1"/>
+                      <a:r>
+                        <a:rPr lang="en-US" altLang="ko-KR" sz="1200" b="0" dirty="0">
+                          <a:solidFill>
+                            <a:schemeClr val="tx1"/>
+                          </a:solidFill>
+                          <a:latin typeface="맑은 고딕" pitchFamily="50" charset="-127"/>
+                          <a:ea typeface="맑은 고딕" pitchFamily="50" charset="-127"/>
+                        </a:rPr>
+                        <a:t>V.2.1</a:t>
+                      </a:r>
                       <a:endParaRPr lang="ko-KR" altLang="en-US" sz="1200" b="0" dirty="0">
                         <a:solidFill>
                           <a:schemeClr val="tx1"/>
@@ -18156,13 +18096,46 @@
                     <a:lstStyle/>
                     <a:p>
                       <a:pPr algn="ctr" latinLnBrk="1"/>
-                      <a:endParaRPr lang="ko-KR" altLang="en-US" sz="1200" b="0" dirty="0">
+                      <a:r>
+                        <a:rPr lang="ko-KR" altLang="en-US" sz="1200" b="0" dirty="0" err="1">
+                          <a:solidFill>
+                            <a:schemeClr val="tx1"/>
+                          </a:solidFill>
+                          <a:latin typeface="맑은 고딕" pitchFamily="50" charset="-127"/>
+                          <a:ea typeface="맑은 고딕" pitchFamily="50" charset="-127"/>
+                        </a:rPr>
+                        <a:t>회원정보찾기</a:t>
+                      </a:r>
+                      <a:r>
+                        <a:rPr lang="ko-KR" altLang="en-US" sz="1200" b="0" dirty="0">
+                          <a:solidFill>
+                            <a:schemeClr val="tx1"/>
+                          </a:solidFill>
+                          <a:latin typeface="맑은 고딕" pitchFamily="50" charset="-127"/>
+                          <a:ea typeface="맑은 고딕" pitchFamily="50" charset="-127"/>
+                        </a:rPr>
+                        <a:t> 관련 클래스</a:t>
+                      </a:r>
+                      <a:endParaRPr lang="en-US" altLang="ko-KR" sz="1200" b="0" dirty="0">
                         <a:solidFill>
                           <a:schemeClr val="tx1"/>
                         </a:solidFill>
                         <a:latin typeface="맑은 고딕" pitchFamily="50" charset="-127"/>
                         <a:ea typeface="맑은 고딕" pitchFamily="50" charset="-127"/>
                       </a:endParaRPr>
+                    </a:p>
+                    <a:p>
+                      <a:pPr algn="ctr" latinLnBrk="1"/>
+                      <a:r>
+                        <a:rPr lang="ko-KR" altLang="en-US" sz="1200" b="0" dirty="0">
+                          <a:solidFill>
+                            <a:schemeClr val="tx1"/>
+                          </a:solidFill>
+                          <a:latin typeface="맑은 고딕" pitchFamily="50" charset="-127"/>
+                          <a:ea typeface="맑은 고딕" pitchFamily="50" charset="-127"/>
+                        </a:rPr>
+                        <a:t>속성 및 메소드 수정</a:t>
+                      </a:r>
                     </a:p>
                   </a:txBody>
                   <a:tcPr anchor="ctr">
@@ -18177,6 +18150,16 @@
                     <a:lstStyle/>
                     <a:p>
                       <a:pPr algn="ctr" latinLnBrk="1"/>
+                      <a:r>
+                        <a:rPr lang="ko-KR" altLang="en-US" sz="1200" b="0" dirty="0" err="1">
+                          <a:solidFill>
+                            <a:schemeClr val="tx1"/>
+                          </a:solidFill>
+                          <a:latin typeface="맑은 고딕" pitchFamily="50" charset="-127"/>
+                          <a:ea typeface="맑은 고딕" pitchFamily="50" charset="-127"/>
+                        </a:rPr>
+                        <a:t>김한동</a:t>
+                      </a:r>
                       <a:endParaRPr lang="ko-KR" altLang="en-US" sz="1200" b="0" dirty="0">
                         <a:solidFill>
                           <a:schemeClr val="tx1"/>
@@ -32277,14 +32260,14 @@
           <p:nvPr>
             <p:extLst>
               <p:ext uri="{D42A27DB-BD31-4B8C-83A1-F6EECF244321}">
-                <p14:modId xmlns:p14="http://schemas.microsoft.com/office/powerpoint/2010/main" val="3337590822"/>
+                <p14:modId xmlns:p14="http://schemas.microsoft.com/office/powerpoint/2010/main" val="3649611377"/>
               </p:ext>
             </p:extLst>
           </p:nvPr>
         </p:nvGraphicFramePr>
         <p:xfrm>
           <a:off x="5770501" y="1387213"/>
-          <a:ext cx="2312299" cy="1661160"/>
+          <a:ext cx="2312299" cy="1465814"/>
         </p:xfrm>
         <a:graphic>
           <a:graphicData uri="http://schemas.openxmlformats.org/drawingml/2006/table">
@@ -32411,60 +32394,6 @@
                             <a:schemeClr val="tx1"/>
                           </a:solidFill>
                         </a:rPr>
-                        <a:t>-</a:t>
-                      </a:r>
-                      <a:r>
-                        <a:rPr lang="en-US" altLang="ko-KR" sz="1100" dirty="0" err="1">
-                          <a:solidFill>
-                            <a:schemeClr val="tx1"/>
-                          </a:solidFill>
-                        </a:rPr>
-                        <a:t>findID</a:t>
-                      </a:r>
-                      <a:r>
-                        <a:rPr lang="en-US" altLang="ko-KR" sz="1100" dirty="0">
-                          <a:solidFill>
-                            <a:schemeClr val="tx1"/>
-                          </a:solidFill>
-                        </a:rPr>
-                        <a:t> : Boolean</a:t>
-                      </a:r>
-                    </a:p>
-                    <a:p>
-                      <a:pPr algn="l" latinLnBrk="1"/>
-                      <a:r>
-                        <a:rPr lang="en-US" altLang="ko-KR" sz="1100" dirty="0">
-                          <a:solidFill>
-                            <a:schemeClr val="tx1"/>
-                          </a:solidFill>
-                        </a:rPr>
-                        <a:t>-</a:t>
-                      </a:r>
-                      <a:r>
-                        <a:rPr lang="en-US" altLang="ko-KR" sz="1100" dirty="0" err="1">
-                          <a:solidFill>
-                            <a:schemeClr val="tx1"/>
-                          </a:solidFill>
-                        </a:rPr>
-                        <a:t>findPW</a:t>
-                      </a:r>
-                      <a:r>
-                        <a:rPr lang="en-US" altLang="ko-KR" sz="1100" dirty="0">
-                          <a:solidFill>
-                            <a:schemeClr val="tx1"/>
-                          </a:solidFill>
-                        </a:rPr>
-                        <a:t> : Boolean</a:t>
-                      </a:r>
-                    </a:p>
-                    <a:p>
-                      <a:pPr algn="l" latinLnBrk="1"/>
-                      <a:r>
-                        <a:rPr lang="en-US" altLang="ko-KR" sz="1100" dirty="0">
-                          <a:solidFill>
-                            <a:schemeClr val="tx1"/>
-                          </a:solidFill>
-                        </a:rPr>
                         <a:t>-search : Boolean</a:t>
                       </a:r>
                     </a:p>
@@ -32538,7 +32467,7 @@
                             <a:schemeClr val="tx1"/>
                           </a:solidFill>
                         </a:rPr>
-                        <a:t>returnID</a:t>
+                        <a:t>returnIDnPW</a:t>
                       </a:r>
                       <a:r>
                         <a:rPr lang="en-US" altLang="ko-KR" sz="1100" dirty="0">
@@ -32555,49 +32484,6 @@
                           </a:solidFill>
                         </a:rPr>
                         <a:t>inputEmail</a:t>
-                      </a:r>
-                      <a:r>
-                        <a:rPr lang="en-US" altLang="ko-KR" sz="1100" dirty="0">
-                          <a:solidFill>
-                            <a:schemeClr val="tx1"/>
-                          </a:solidFill>
-                        </a:rPr>
-                        <a:t>) : String</a:t>
-                      </a:r>
-                    </a:p>
-                    <a:p>
-                      <a:pPr algn="l" latinLnBrk="1"/>
-                      <a:r>
-                        <a:rPr lang="en-US" altLang="ko-KR" sz="1100" dirty="0">
-                          <a:solidFill>
-                            <a:schemeClr val="tx1"/>
-                          </a:solidFill>
-                        </a:rPr>
-                        <a:t>+</a:t>
-                      </a:r>
-                      <a:r>
-                        <a:rPr lang="en-US" altLang="ko-KR" sz="1100" dirty="0" err="1">
-                          <a:solidFill>
-                            <a:schemeClr val="tx1"/>
-                          </a:solidFill>
-                        </a:rPr>
-                        <a:t>returnPW</a:t>
-                      </a:r>
-                      <a:r>
-                        <a:rPr lang="en-US" altLang="ko-KR" sz="1100" dirty="0">
-                          <a:solidFill>
-                            <a:schemeClr val="tx1"/>
-                          </a:solidFill>
-                        </a:rPr>
-                        <a:t>(</a:t>
-                      </a:r>
-                      <a:r>
-                        <a:rPr lang="en-US" altLang="ko-KR" sz="1100" dirty="0" err="1">
-                          <a:solidFill>
-                            <a:schemeClr val="tx1"/>
-                          </a:solidFill>
-                        </a:rPr>
-                        <a:t>InputEmail</a:t>
                       </a:r>
                       <a:r>
                         <a:rPr lang="en-US" altLang="ko-KR" sz="1100" dirty="0">

</xml_diff>